<commit_message>
Add Area,Gove To Ouser And MedicalSessionEndPoint
</commit_message>
<xml_diff>
--- a/Documents/Api_Docus/AuthEndpoint.pptx
+++ b/Documents/Api_Docus/AuthEndpoint.pptx
@@ -246,7 +246,7 @@
           <a:p>
             <a:fld id="{8EA9AC7A-5CA4-46C9-8499-A343BEBAAA0F}" type="datetimeFigureOut">
               <a:rPr lang="en-US" smtClean="0"/>
-              <a:t>2/24/2024</a:t>
+              <a:t>3/3/2024</a:t>
             </a:fld>
             <a:endParaRPr lang="en-US"/>
           </a:p>
@@ -416,7 +416,7 @@
           <a:p>
             <a:fld id="{8EA9AC7A-5CA4-46C9-8499-A343BEBAAA0F}" type="datetimeFigureOut">
               <a:rPr lang="en-US" smtClean="0"/>
-              <a:t>2/24/2024</a:t>
+              <a:t>3/3/2024</a:t>
             </a:fld>
             <a:endParaRPr lang="en-US"/>
           </a:p>
@@ -596,7 +596,7 @@
           <a:p>
             <a:fld id="{8EA9AC7A-5CA4-46C9-8499-A343BEBAAA0F}" type="datetimeFigureOut">
               <a:rPr lang="en-US" smtClean="0"/>
-              <a:t>2/24/2024</a:t>
+              <a:t>3/3/2024</a:t>
             </a:fld>
             <a:endParaRPr lang="en-US"/>
           </a:p>
@@ -766,7 +766,7 @@
           <a:p>
             <a:fld id="{8EA9AC7A-5CA4-46C9-8499-A343BEBAAA0F}" type="datetimeFigureOut">
               <a:rPr lang="en-US" smtClean="0"/>
-              <a:t>2/24/2024</a:t>
+              <a:t>3/3/2024</a:t>
             </a:fld>
             <a:endParaRPr lang="en-US"/>
           </a:p>
@@ -1010,7 +1010,7 @@
           <a:p>
             <a:fld id="{8EA9AC7A-5CA4-46C9-8499-A343BEBAAA0F}" type="datetimeFigureOut">
               <a:rPr lang="en-US" smtClean="0"/>
-              <a:t>2/24/2024</a:t>
+              <a:t>3/3/2024</a:t>
             </a:fld>
             <a:endParaRPr lang="en-US"/>
           </a:p>
@@ -1242,7 +1242,7 @@
           <a:p>
             <a:fld id="{8EA9AC7A-5CA4-46C9-8499-A343BEBAAA0F}" type="datetimeFigureOut">
               <a:rPr lang="en-US" smtClean="0"/>
-              <a:t>2/24/2024</a:t>
+              <a:t>3/3/2024</a:t>
             </a:fld>
             <a:endParaRPr lang="en-US"/>
           </a:p>
@@ -1609,7 +1609,7 @@
           <a:p>
             <a:fld id="{8EA9AC7A-5CA4-46C9-8499-A343BEBAAA0F}" type="datetimeFigureOut">
               <a:rPr lang="en-US" smtClean="0"/>
-              <a:t>2/24/2024</a:t>
+              <a:t>3/3/2024</a:t>
             </a:fld>
             <a:endParaRPr lang="en-US"/>
           </a:p>
@@ -1727,7 +1727,7 @@
           <a:p>
             <a:fld id="{8EA9AC7A-5CA4-46C9-8499-A343BEBAAA0F}" type="datetimeFigureOut">
               <a:rPr lang="en-US" smtClean="0"/>
-              <a:t>2/24/2024</a:t>
+              <a:t>3/3/2024</a:t>
             </a:fld>
             <a:endParaRPr lang="en-US"/>
           </a:p>
@@ -1822,7 +1822,7 @@
           <a:p>
             <a:fld id="{8EA9AC7A-5CA4-46C9-8499-A343BEBAAA0F}" type="datetimeFigureOut">
               <a:rPr lang="en-US" smtClean="0"/>
-              <a:t>2/24/2024</a:t>
+              <a:t>3/3/2024</a:t>
             </a:fld>
             <a:endParaRPr lang="en-US"/>
           </a:p>
@@ -2099,7 +2099,7 @@
           <a:p>
             <a:fld id="{8EA9AC7A-5CA4-46C9-8499-A343BEBAAA0F}" type="datetimeFigureOut">
               <a:rPr lang="en-US" smtClean="0"/>
-              <a:t>2/24/2024</a:t>
+              <a:t>3/3/2024</a:t>
             </a:fld>
             <a:endParaRPr lang="en-US"/>
           </a:p>
@@ -2356,7 +2356,7 @@
           <a:p>
             <a:fld id="{8EA9AC7A-5CA4-46C9-8499-A343BEBAAA0F}" type="datetimeFigureOut">
               <a:rPr lang="en-US" smtClean="0"/>
-              <a:t>2/24/2024</a:t>
+              <a:t>3/3/2024</a:t>
             </a:fld>
             <a:endParaRPr lang="en-US"/>
           </a:p>
@@ -2569,7 +2569,7 @@
           <a:p>
             <a:fld id="{8EA9AC7A-5CA4-46C9-8499-A343BEBAAA0F}" type="datetimeFigureOut">
               <a:rPr lang="en-US" smtClean="0"/>
-              <a:t>2/24/2024</a:t>
+              <a:t>3/3/2024</a:t>
             </a:fld>
             <a:endParaRPr lang="en-US"/>
           </a:p>
@@ -3669,7 +3669,7 @@
         <p:spPr>
           <a:xfrm>
             <a:off x="462455" y="8639503"/>
-            <a:ext cx="6739217" cy="2862322"/>
+            <a:ext cx="6739217" cy="3416320"/>
           </a:xfrm>
           <a:prstGeom prst="rect">
             <a:avLst/>
@@ -3804,6 +3804,31 @@
             <a:r>
               <a:rPr lang="en-US" dirty="0" err="1" smtClean="0"/>
               <a:t>exToken:date</a:t>
+            </a:r>
+            <a:endParaRPr lang="en-US" dirty="0" smtClean="0"/>
+          </a:p>
+          <a:p>
+            <a:r>
+              <a:rPr lang="en-US" dirty="0"/>
+              <a:t>a</a:t>
+            </a:r>
+            <a:r>
+              <a:rPr lang="en-US" dirty="0" smtClean="0"/>
+              <a:t>rea:</a:t>
+            </a:r>
+            <a:r>
+              <a:rPr lang="en-US" dirty="0"/>
+              <a:t> </a:t>
+            </a:r>
+            <a:r>
+              <a:rPr lang="en-US" dirty="0" smtClean="0"/>
+              <a:t>string</a:t>
+            </a:r>
+          </a:p>
+          <a:p>
+            <a:r>
+              <a:rPr lang="en-US" smtClean="0"/>
+              <a:t>gove:string</a:t>
             </a:r>
             <a:endParaRPr lang="en-US" dirty="0"/>
           </a:p>
@@ -7316,7 +7341,6 @@
               <a:rPr lang="en-US" dirty="0"/>
               <a:t>}</a:t>
             </a:r>
-            <a:endParaRPr lang="en-US" dirty="0"/>
           </a:p>
         </p:txBody>
       </p:sp>

</xml_diff>